<commit_message>
Tweaks re color blindness
</commit_message>
<xml_diff>
--- a/Lessons/3-Intro to Color/Color.pptx
+++ b/Lessons/3-Intro to Color/Color.pptx
@@ -214,7 +214,7 @@
           <a:p>
             <a:fld id="{CD0A6D21-6A00-42D5-84A1-E4A5B4913B51}" type="datetimeFigureOut">
               <a:rPr lang="en-US" smtClean="0"/>
-              <a:t>3/27/18</a:t>
+              <a:t>3/29/18</a:t>
             </a:fld>
             <a:endParaRPr lang="en-US" dirty="0"/>
           </a:p>
@@ -379,7 +379,7 @@
           <a:p>
             <a:fld id="{2B8FCCE8-EDBB-470B-8DF7-8A7315C1C4A9}" type="datetimeFigureOut">
               <a:rPr lang="en-US" smtClean="0"/>
-              <a:t>3/27/18</a:t>
+              <a:t>3/29/18</a:t>
             </a:fld>
             <a:endParaRPr lang="en-US" dirty="0"/>
           </a:p>
@@ -1737,7 +1737,7 @@
           <a:p>
             <a:fld id="{99CC7F13-33C4-472F-B9DE-B5AC0FF7F7A8}" type="datetimeFigureOut">
               <a:rPr lang="en-US" smtClean="0"/>
-              <a:t>3/27/18</a:t>
+              <a:t>3/29/18</a:t>
             </a:fld>
             <a:endParaRPr lang="en-US" dirty="0"/>
           </a:p>
@@ -1877,7 +1877,7 @@
           <a:p>
             <a:fld id="{99CC7F13-33C4-472F-B9DE-B5AC0FF7F7A8}" type="datetimeFigureOut">
               <a:rPr lang="en-US" smtClean="0"/>
-              <a:t>3/27/18</a:t>
+              <a:t>3/29/18</a:t>
             </a:fld>
             <a:endParaRPr lang="en-US" dirty="0"/>
           </a:p>
@@ -1993,7 +1993,7 @@
           <a:p>
             <a:fld id="{99CC7F13-33C4-472F-B9DE-B5AC0FF7F7A8}" type="datetimeFigureOut">
               <a:rPr lang="en-US" smtClean="0"/>
-              <a:t>3/27/18</a:t>
+              <a:t>3/29/18</a:t>
             </a:fld>
             <a:endParaRPr lang="en-US" dirty="0"/>
           </a:p>
@@ -2109,7 +2109,7 @@
           <a:p>
             <a:fld id="{99CC7F13-33C4-472F-B9DE-B5AC0FF7F7A8}" type="datetimeFigureOut">
               <a:rPr lang="en-US" smtClean="0"/>
-              <a:t>3/27/18</a:t>
+              <a:t>3/29/18</a:t>
             </a:fld>
             <a:endParaRPr lang="en-US" dirty="0"/>
           </a:p>
@@ -2162,7 +2162,7 @@
           <a:p>
             <a:fld id="{99CC7F13-33C4-472F-B9DE-B5AC0FF7F7A8}" type="datetimeFigureOut">
               <a:rPr lang="en-US" smtClean="0"/>
-              <a:t>3/27/18</a:t>
+              <a:t>3/29/18</a:t>
             </a:fld>
             <a:endParaRPr lang="en-US" dirty="0"/>
           </a:p>
@@ -2412,7 +2412,7 @@
           <a:p>
             <a:fld id="{99CC7F13-33C4-472F-B9DE-B5AC0FF7F7A8}" type="datetimeFigureOut">
               <a:rPr lang="en-US" smtClean="0"/>
-              <a:t>3/27/18</a:t>
+              <a:t>3/29/18</a:t>
             </a:fld>
             <a:endParaRPr lang="en-US" dirty="0"/>
           </a:p>
@@ -2565,7 +2565,7 @@
           <a:p>
             <a:fld id="{99CC7F13-33C4-472F-B9DE-B5AC0FF7F7A8}" type="datetimeFigureOut">
               <a:rPr lang="en-US" smtClean="0"/>
-              <a:t>3/27/18</a:t>
+              <a:t>3/29/18</a:t>
             </a:fld>
             <a:endParaRPr lang="en-US" dirty="0"/>
           </a:p>
@@ -2812,7 +2812,7 @@
           <a:p>
             <a:fld id="{99CC7F13-33C4-472F-B9DE-B5AC0FF7F7A8}" type="datetimeFigureOut">
               <a:rPr lang="en-US" smtClean="0"/>
-              <a:t>3/27/18</a:t>
+              <a:t>3/29/18</a:t>
             </a:fld>
             <a:endParaRPr lang="en-US" dirty="0"/>
           </a:p>
@@ -3198,7 +3198,7 @@
           <a:p>
             <a:fld id="{99CC7F13-33C4-472F-B9DE-B5AC0FF7F7A8}" type="datetimeFigureOut">
               <a:rPr lang="en-US" smtClean="0"/>
-              <a:t>3/27/18</a:t>
+              <a:t>3/29/18</a:t>
             </a:fld>
             <a:endParaRPr lang="en-US" dirty="0"/>
           </a:p>
@@ -3277,7 +3277,7 @@
           <a:p>
             <a:fld id="{99CC7F13-33C4-472F-B9DE-B5AC0FF7F7A8}" type="datetimeFigureOut">
               <a:rPr lang="en-US" smtClean="0"/>
-              <a:t>3/27/18</a:t>
+              <a:t>3/29/18</a:t>
             </a:fld>
             <a:endParaRPr lang="en-US" dirty="0"/>
           </a:p>
@@ -3334,7 +3334,7 @@
           <a:p>
             <a:fld id="{99CC7F13-33C4-472F-B9DE-B5AC0FF7F7A8}" type="datetimeFigureOut">
               <a:rPr lang="en-US" smtClean="0"/>
-              <a:t>3/27/18</a:t>
+              <a:t>3/29/18</a:t>
             </a:fld>
             <a:endParaRPr lang="en-US" dirty="0"/>
           </a:p>
@@ -3571,7 +3571,7 @@
           <a:p>
             <a:fld id="{99CC7F13-33C4-472F-B9DE-B5AC0FF7F7A8}" type="datetimeFigureOut">
               <a:rPr lang="en-US" smtClean="0"/>
-              <a:t>3/27/18</a:t>
+              <a:t>3/29/18</a:t>
             </a:fld>
             <a:endParaRPr lang="en-US" dirty="0"/>
           </a:p>
@@ -3788,7 +3788,7 @@
           <a:p>
             <a:fld id="{99CC7F13-33C4-472F-B9DE-B5AC0FF7F7A8}" type="datetimeFigureOut">
               <a:rPr lang="en-US" smtClean="0"/>
-              <a:t>3/27/18</a:t>
+              <a:t>3/29/18</a:t>
             </a:fld>
             <a:endParaRPr lang="en-US" dirty="0"/>
           </a:p>
@@ -5608,7 +5608,7 @@
         </p:blipFill>
         <p:spPr>
           <a:xfrm>
-            <a:off x="7305675" y="1993901"/>
+            <a:off x="1219200" y="1879601"/>
             <a:ext cx="3810000" cy="3810000"/>
           </a:xfrm>
           <a:prstGeom prst="rect">
@@ -5652,6 +5652,36 @@
           </a:p>
         </p:txBody>
       </p:sp>
+      <p:pic>
+        <p:nvPicPr>
+          <p:cNvPr id="6" name="Picture 5">
+            <a:extLst>
+              <a:ext uri="{FF2B5EF4-FFF2-40B4-BE49-F238E27FC236}">
+                <a16:creationId xmlns:a16="http://schemas.microsoft.com/office/drawing/2014/main" id="{7195EA3D-A6DA-5F41-BF34-B2C23DF93E9C}"/>
+              </a:ext>
+            </a:extLst>
+          </p:cNvPr>
+          <p:cNvPicPr>
+            <a:picLocks noChangeAspect="1"/>
+          </p:cNvPicPr>
+          <p:nvPr/>
+        </p:nvPicPr>
+        <p:blipFill>
+          <a:blip r:embed="rId4"/>
+          <a:stretch>
+            <a:fillRect/>
+          </a:stretch>
+        </p:blipFill>
+        <p:spPr>
+          <a:xfrm>
+            <a:off x="5956609" y="2464595"/>
+            <a:ext cx="5479270" cy="2640012"/>
+          </a:xfrm>
+          <a:prstGeom prst="rect">
+            <a:avLst/>
+          </a:prstGeom>
+        </p:spPr>
+      </p:pic>
     </p:spTree>
     <p:extLst>
       <p:ext uri="{BB962C8B-B14F-4D97-AF65-F5344CB8AC3E}">

</xml_diff>